<commit_message>
add docker start/stop commands, more detailed 'test the installation', run in detached mode to avoid jumping in the container of first execution
</commit_message>
<xml_diff>
--- a/assets/flowchart-mk.pptx
+++ b/assets/flowchart-mk.pptx
@@ -104,6 +104,11 @@
       </a:defRPr>
     </a:lvl9pPr>
   </p:defaultTextStyle>
+  <p:extLst>
+    <p:ext uri="{EFAFB233-063F-42B5-8137-9DF3F51BA10A}">
+      <p15:sldGuideLst xmlns:p15="http://schemas.microsoft.com/office/powerpoint/2012/main"/>
+    </p:ext>
+  </p:extLst>
 </p:presentation>
 </file>
 
@@ -256,7 +261,7 @@
           <a:p>
             <a:fld id="{51B219EA-CC20-4E25-A7D4-801439BF7A67}" type="datetimeFigureOut">
               <a:rPr lang="en-US" smtClean="0"/>
-              <a:t>9/9/2022</a:t>
+              <a:t>9/12/2022</a:t>
             </a:fld>
             <a:endParaRPr lang="en-US"/>
           </a:p>
@@ -456,7 +461,7 @@
           <a:p>
             <a:fld id="{51B219EA-CC20-4E25-A7D4-801439BF7A67}" type="datetimeFigureOut">
               <a:rPr lang="en-US" smtClean="0"/>
-              <a:t>9/9/2022</a:t>
+              <a:t>9/12/2022</a:t>
             </a:fld>
             <a:endParaRPr lang="en-US"/>
           </a:p>
@@ -666,7 +671,7 @@
           <a:p>
             <a:fld id="{51B219EA-CC20-4E25-A7D4-801439BF7A67}" type="datetimeFigureOut">
               <a:rPr lang="en-US" smtClean="0"/>
-              <a:t>9/9/2022</a:t>
+              <a:t>9/12/2022</a:t>
             </a:fld>
             <a:endParaRPr lang="en-US"/>
           </a:p>
@@ -866,7 +871,7 @@
           <a:p>
             <a:fld id="{51B219EA-CC20-4E25-A7D4-801439BF7A67}" type="datetimeFigureOut">
               <a:rPr lang="en-US" smtClean="0"/>
-              <a:t>9/9/2022</a:t>
+              <a:t>9/12/2022</a:t>
             </a:fld>
             <a:endParaRPr lang="en-US"/>
           </a:p>
@@ -1142,7 +1147,7 @@
           <a:p>
             <a:fld id="{51B219EA-CC20-4E25-A7D4-801439BF7A67}" type="datetimeFigureOut">
               <a:rPr lang="en-US" smtClean="0"/>
-              <a:t>9/9/2022</a:t>
+              <a:t>9/12/2022</a:t>
             </a:fld>
             <a:endParaRPr lang="en-US"/>
           </a:p>
@@ -1410,7 +1415,7 @@
           <a:p>
             <a:fld id="{51B219EA-CC20-4E25-A7D4-801439BF7A67}" type="datetimeFigureOut">
               <a:rPr lang="en-US" smtClean="0"/>
-              <a:t>9/9/2022</a:t>
+              <a:t>9/12/2022</a:t>
             </a:fld>
             <a:endParaRPr lang="en-US"/>
           </a:p>
@@ -1825,7 +1830,7 @@
           <a:p>
             <a:fld id="{51B219EA-CC20-4E25-A7D4-801439BF7A67}" type="datetimeFigureOut">
               <a:rPr lang="en-US" smtClean="0"/>
-              <a:t>9/9/2022</a:t>
+              <a:t>9/12/2022</a:t>
             </a:fld>
             <a:endParaRPr lang="en-US"/>
           </a:p>
@@ -1967,7 +1972,7 @@
           <a:p>
             <a:fld id="{51B219EA-CC20-4E25-A7D4-801439BF7A67}" type="datetimeFigureOut">
               <a:rPr lang="en-US" smtClean="0"/>
-              <a:t>9/9/2022</a:t>
+              <a:t>9/12/2022</a:t>
             </a:fld>
             <a:endParaRPr lang="en-US"/>
           </a:p>
@@ -2080,7 +2085,7 @@
           <a:p>
             <a:fld id="{51B219EA-CC20-4E25-A7D4-801439BF7A67}" type="datetimeFigureOut">
               <a:rPr lang="en-US" smtClean="0"/>
-              <a:t>9/9/2022</a:t>
+              <a:t>9/12/2022</a:t>
             </a:fld>
             <a:endParaRPr lang="en-US"/>
           </a:p>
@@ -2393,7 +2398,7 @@
           <a:p>
             <a:fld id="{51B219EA-CC20-4E25-A7D4-801439BF7A67}" type="datetimeFigureOut">
               <a:rPr lang="en-US" smtClean="0"/>
-              <a:t>9/9/2022</a:t>
+              <a:t>9/12/2022</a:t>
             </a:fld>
             <a:endParaRPr lang="en-US"/>
           </a:p>
@@ -2682,7 +2687,7 @@
           <a:p>
             <a:fld id="{51B219EA-CC20-4E25-A7D4-801439BF7A67}" type="datetimeFigureOut">
               <a:rPr lang="en-US" smtClean="0"/>
-              <a:t>9/9/2022</a:t>
+              <a:t>9/12/2022</a:t>
             </a:fld>
             <a:endParaRPr lang="en-US"/>
           </a:p>
@@ -2925,7 +2930,7 @@
           <a:p>
             <a:fld id="{51B219EA-CC20-4E25-A7D4-801439BF7A67}" type="datetimeFigureOut">
               <a:rPr lang="en-US" smtClean="0"/>
-              <a:t>9/9/2022</a:t>
+              <a:t>9/12/2022</a:t>
             </a:fld>
             <a:endParaRPr lang="en-US"/>
           </a:p>
@@ -3356,7 +3361,7 @@
         </p:nvSpPr>
         <p:spPr>
           <a:xfrm>
-            <a:off x="2774160" y="294129"/>
+            <a:off x="3190696" y="878926"/>
             <a:ext cx="1584000" cy="504000"/>
           </a:xfrm>
           <a:prstGeom prst="rect">
@@ -3408,7 +3413,7 @@
         </p:nvSpPr>
         <p:spPr>
           <a:xfrm>
-            <a:off x="84517" y="2533529"/>
+            <a:off x="488470" y="2830145"/>
             <a:ext cx="2045811" cy="1257301"/>
           </a:xfrm>
           <a:prstGeom prst="diamond">
@@ -3478,7 +3483,7 @@
         </p:nvSpPr>
         <p:spPr>
           <a:xfrm>
-            <a:off x="2807236" y="1501014"/>
+            <a:off x="3190696" y="2061452"/>
             <a:ext cx="1584000" cy="540000"/>
           </a:xfrm>
           <a:prstGeom prst="rect">
@@ -3530,7 +3535,7 @@
         </p:nvSpPr>
         <p:spPr>
           <a:xfrm>
-            <a:off x="2774160" y="6023871"/>
+            <a:off x="3190696" y="5092149"/>
             <a:ext cx="1584000" cy="540000"/>
           </a:xfrm>
           <a:prstGeom prst="rect">
@@ -3570,10 +3575,10 @@
       </p:sp>
       <p:sp>
         <p:nvSpPr>
-          <p:cNvPr id="15" name="Rettangolo 14">
-            <a:extLst>
-              <a:ext uri="{FF2B5EF4-FFF2-40B4-BE49-F238E27FC236}">
-                <a16:creationId xmlns:a16="http://schemas.microsoft.com/office/drawing/2014/main" id="{123D81D1-8169-C766-F712-AA655518B953}"/>
+          <p:cNvPr id="17" name="Rettangolo 16">
+            <a:extLst>
+              <a:ext uri="{FF2B5EF4-FFF2-40B4-BE49-F238E27FC236}">
+                <a16:creationId xmlns:a16="http://schemas.microsoft.com/office/drawing/2014/main" id="{0405C992-E451-3B4C-EBF3-7B693C22FB09}"/>
               </a:ext>
             </a:extLst>
           </p:cNvPr>
@@ -3582,64 +3587,7 @@
         </p:nvSpPr>
         <p:spPr>
           <a:xfrm>
-            <a:off x="10392000" y="5731023"/>
-            <a:ext cx="1800000" cy="1080000"/>
-          </a:xfrm>
-          <a:prstGeom prst="rect">
-            <a:avLst/>
-          </a:prstGeom>
-          <a:solidFill>
-            <a:schemeClr val="accent2">
-              <a:lumMod val="75000"/>
-            </a:schemeClr>
-          </a:solidFill>
-          <a:ln>
-            <a:noFill/>
-          </a:ln>
-        </p:spPr>
-        <p:style>
-          <a:lnRef idx="2">
-            <a:schemeClr val="accent1">
-              <a:shade val="50000"/>
-            </a:schemeClr>
-          </a:lnRef>
-          <a:fillRef idx="1">
-            <a:schemeClr val="accent1"/>
-          </a:fillRef>
-          <a:effectRef idx="0">
-            <a:schemeClr val="accent1"/>
-          </a:effectRef>
-          <a:fontRef idx="minor">
-            <a:schemeClr val="lt1"/>
-          </a:fontRef>
-        </p:style>
-        <p:txBody>
-          <a:bodyPr rtlCol="0" anchor="ctr"/>
-          <a:lstStyle/>
-          <a:p>
-            <a:pPr algn="ctr"/>
-            <a:r>
-              <a:rPr lang="en-US" dirty="0"/>
-              <a:t>Native Linux Installation (Section 2.1)</a:t>
-            </a:r>
-          </a:p>
-        </p:txBody>
-      </p:sp>
-      <p:sp>
-        <p:nvSpPr>
-          <p:cNvPr id="17" name="Rettangolo 16">
-            <a:extLst>
-              <a:ext uri="{FF2B5EF4-FFF2-40B4-BE49-F238E27FC236}">
-                <a16:creationId xmlns:a16="http://schemas.microsoft.com/office/drawing/2014/main" id="{0405C992-E451-3B4C-EBF3-7B693C22FB09}"/>
-              </a:ext>
-            </a:extLst>
-          </p:cNvPr>
-          <p:cNvSpPr/>
-          <p:nvPr/>
-        </p:nvSpPr>
-        <p:spPr>
-          <a:xfrm>
-            <a:off x="10392000" y="0"/>
+            <a:off x="9999092" y="4822149"/>
             <a:ext cx="1800000" cy="1080000"/>
           </a:xfrm>
           <a:prstGeom prst="rect">
@@ -3701,19 +3649,17 @@
           <p:cNvCxnSpPr>
             <a:cxnSpLocks/>
             <a:stCxn id="6" idx="3"/>
-            <a:endCxn id="17" idx="1"/>
+            <a:endCxn id="17" idx="0"/>
           </p:cNvCxnSpPr>
           <p:nvPr/>
         </p:nvCxnSpPr>
         <p:spPr>
-          <a:xfrm flipV="1">
-            <a:off x="4358160" y="540000"/>
-            <a:ext cx="6033840" cy="6129"/>
+          <a:xfrm>
+            <a:off x="4774696" y="1130926"/>
+            <a:ext cx="6124396" cy="3691223"/>
           </a:xfrm>
-          <a:prstGeom prst="bentConnector3">
-            <a:avLst>
-              <a:gd name="adj1" fmla="val 50000"/>
-            </a:avLst>
+          <a:prstGeom prst="bentConnector2">
+            <a:avLst/>
           </a:prstGeom>
           <a:ln w="57150">
             <a:solidFill>
@@ -3740,121 +3686,6 @@
           </a:fontRef>
         </p:style>
       </p:cxnSp>
-      <p:sp>
-        <p:nvSpPr>
-          <p:cNvPr id="23" name="Rombo 22">
-            <a:extLst>
-              <a:ext uri="{FF2B5EF4-FFF2-40B4-BE49-F238E27FC236}">
-                <a16:creationId xmlns:a16="http://schemas.microsoft.com/office/drawing/2014/main" id="{82644EB6-42F7-A074-F257-93EC4F5CE5EB}"/>
-              </a:ext>
-            </a:extLst>
-          </p:cNvPr>
-          <p:cNvSpPr/>
-          <p:nvPr/>
-        </p:nvSpPr>
-        <p:spPr>
-          <a:xfrm>
-            <a:off x="5710770" y="5830492"/>
-            <a:ext cx="1795460" cy="881062"/>
-          </a:xfrm>
-          <a:prstGeom prst="diamond">
-            <a:avLst/>
-          </a:prstGeom>
-          <a:solidFill>
-            <a:schemeClr val="accent4">
-              <a:lumMod val="60000"/>
-              <a:lumOff val="40000"/>
-            </a:schemeClr>
-          </a:solidFill>
-          <a:ln>
-            <a:noFill/>
-          </a:ln>
-        </p:spPr>
-        <p:style>
-          <a:lnRef idx="2">
-            <a:schemeClr val="accent1">
-              <a:shade val="50000"/>
-            </a:schemeClr>
-          </a:lnRef>
-          <a:fillRef idx="1">
-            <a:schemeClr val="accent1"/>
-          </a:fillRef>
-          <a:effectRef idx="0">
-            <a:schemeClr val="accent1"/>
-          </a:effectRef>
-          <a:fontRef idx="minor">
-            <a:schemeClr val="lt1"/>
-          </a:fontRef>
-        </p:style>
-        <p:txBody>
-          <a:bodyPr rtlCol="0" anchor="ctr"/>
-          <a:lstStyle/>
-          <a:p>
-            <a:pPr algn="ctr"/>
-            <a:r>
-              <a:rPr lang="en-US" dirty="0">
-                <a:ln w="0"/>
-                <a:solidFill>
-                  <a:schemeClr val="tx1"/>
-                </a:solidFill>
-                <a:effectLst>
-                  <a:outerShdw blurRad="38100" dist="19050" dir="2700000" algn="tl" rotWithShape="0">
-                    <a:schemeClr val="dk1">
-                      <a:alpha val="40000"/>
-                    </a:schemeClr>
-                  </a:outerShdw>
-                </a:effectLst>
-              </a:rPr>
-              <a:t>You can choose</a:t>
-            </a:r>
-          </a:p>
-        </p:txBody>
-      </p:sp>
-      <p:cxnSp>
-        <p:nvCxnSpPr>
-          <p:cNvPr id="39" name="Connettore 2 38">
-            <a:extLst>
-              <a:ext uri="{FF2B5EF4-FFF2-40B4-BE49-F238E27FC236}">
-                <a16:creationId xmlns:a16="http://schemas.microsoft.com/office/drawing/2014/main" id="{70C5094E-920A-187C-0A5D-118B80952A80}"/>
-              </a:ext>
-            </a:extLst>
-          </p:cNvPr>
-          <p:cNvCxnSpPr>
-            <a:stCxn id="13" idx="3"/>
-            <a:endCxn id="23" idx="1"/>
-          </p:cNvCxnSpPr>
-          <p:nvPr/>
-        </p:nvCxnSpPr>
-        <p:spPr>
-          <a:xfrm flipV="1">
-            <a:off x="4358160" y="6271023"/>
-            <a:ext cx="1352610" cy="22848"/>
-          </a:xfrm>
-          <a:prstGeom prst="straightConnector1">
-            <a:avLst/>
-          </a:prstGeom>
-          <a:ln w="57150">
-            <a:solidFill>
-              <a:schemeClr val="tx1"/>
-            </a:solidFill>
-            <a:tailEnd type="triangle"/>
-          </a:ln>
-        </p:spPr>
-        <p:style>
-          <a:lnRef idx="1">
-            <a:schemeClr val="accent1"/>
-          </a:lnRef>
-          <a:fillRef idx="0">
-            <a:schemeClr val="accent1"/>
-          </a:fillRef>
-          <a:effectRef idx="0">
-            <a:schemeClr val="accent1"/>
-          </a:effectRef>
-          <a:fontRef idx="minor">
-            <a:schemeClr val="tx1"/>
-          </a:fontRef>
-        </p:style>
-      </p:cxnSp>
       <p:cxnSp>
         <p:nvCxnSpPr>
           <p:cNvPr id="41" name="Connettore a gomito 40">
@@ -3873,12 +3704,12 @@
         </p:nvCxnSpPr>
         <p:spPr>
           <a:xfrm>
-            <a:off x="2130328" y="3162180"/>
-            <a:ext cx="643832" cy="3131691"/>
+            <a:off x="2534281" y="3458796"/>
+            <a:ext cx="656415" cy="1903353"/>
           </a:xfrm>
           <a:prstGeom prst="bentConnector3">
             <a:avLst>
-              <a:gd name="adj1" fmla="val 52219"/>
+              <a:gd name="adj1" fmla="val 50000"/>
             </a:avLst>
           </a:prstGeom>
           <a:ln w="57150">
@@ -3921,8 +3752,8 @@
         </p:nvCxnSpPr>
         <p:spPr>
           <a:xfrm flipV="1">
-            <a:off x="2130328" y="1771014"/>
-            <a:ext cx="676908" cy="1391166"/>
+            <a:off x="2534281" y="2331452"/>
+            <a:ext cx="656415" cy="1127344"/>
           </a:xfrm>
           <a:prstGeom prst="bentConnector3">
             <a:avLst>
@@ -3969,8 +3800,8 @@
         </p:nvCxnSpPr>
         <p:spPr>
           <a:xfrm flipV="1">
-            <a:off x="2130328" y="546129"/>
-            <a:ext cx="643832" cy="2616051"/>
+            <a:off x="2534281" y="1130926"/>
+            <a:ext cx="656415" cy="2327870"/>
           </a:xfrm>
           <a:prstGeom prst="bentConnector3">
             <a:avLst>
@@ -4001,113 +3832,19 @@
       </p:cxnSp>
       <p:sp>
         <p:nvSpPr>
-          <p:cNvPr id="46" name="CasellaDiTesto 45">
-            <a:extLst>
-              <a:ext uri="{FF2B5EF4-FFF2-40B4-BE49-F238E27FC236}">
-                <a16:creationId xmlns:a16="http://schemas.microsoft.com/office/drawing/2014/main" id="{A09A7774-B38C-EA68-C6DF-6B75612E64B4}"/>
-              </a:ext>
-            </a:extLst>
-          </p:cNvPr>
-          <p:cNvSpPr txBox="1"/>
+          <p:cNvPr id="81" name="Rombo 80">
+            <a:extLst>
+              <a:ext uri="{FF2B5EF4-FFF2-40B4-BE49-F238E27FC236}">
+                <a16:creationId xmlns:a16="http://schemas.microsoft.com/office/drawing/2014/main" id="{E2BDDA09-2ED4-F927-8010-472674B25E04}"/>
+              </a:ext>
+            </a:extLst>
+          </p:cNvPr>
+          <p:cNvSpPr/>
           <p:nvPr/>
         </p:nvSpPr>
         <p:spPr>
           <a:xfrm>
-            <a:off x="7488599" y="5795199"/>
-            <a:ext cx="2885768" cy="369332"/>
-          </a:xfrm>
-          <a:prstGeom prst="rect">
-            <a:avLst/>
-          </a:prstGeom>
-          <a:noFill/>
-        </p:spPr>
-        <p:txBody>
-          <a:bodyPr wrap="square" rtlCol="0">
-            <a:spAutoFit/>
-          </a:bodyPr>
-          <a:lstStyle/>
-          <a:p>
-            <a:r>
-              <a:rPr lang="en-US" dirty="0">
-                <a:solidFill>
-                  <a:schemeClr val="accent2">
-                    <a:lumMod val="75000"/>
-                  </a:schemeClr>
-                </a:solidFill>
-              </a:rPr>
-              <a:t>Fast with no compromise</a:t>
-            </a:r>
-          </a:p>
-        </p:txBody>
-      </p:sp>
-      <p:sp>
-        <p:nvSpPr>
-          <p:cNvPr id="48" name="CasellaDiTesto 47">
-            <a:extLst>
-              <a:ext uri="{FF2B5EF4-FFF2-40B4-BE49-F238E27FC236}">
-                <a16:creationId xmlns:a16="http://schemas.microsoft.com/office/drawing/2014/main" id="{AFE31493-F8AD-CA12-1CE9-4D4226D0BE9E}"/>
-              </a:ext>
-            </a:extLst>
-          </p:cNvPr>
-          <p:cNvSpPr txBox="1"/>
-          <p:nvPr/>
-        </p:nvSpPr>
-        <p:spPr>
-          <a:xfrm>
-            <a:off x="7420674" y="4119371"/>
-            <a:ext cx="3437826" cy="646331"/>
-          </a:xfrm>
-          <a:prstGeom prst="rect">
-            <a:avLst/>
-          </a:prstGeom>
-          <a:noFill/>
-        </p:spPr>
-        <p:txBody>
-          <a:bodyPr wrap="square" rtlCol="0">
-            <a:spAutoFit/>
-          </a:bodyPr>
-          <a:lstStyle/>
-          <a:p>
-            <a:r>
-              <a:rPr lang="en-US" dirty="0">
-                <a:solidFill>
-                  <a:schemeClr val="accent6">
-                    <a:lumMod val="75000"/>
-                  </a:schemeClr>
-                </a:solidFill>
-              </a:rPr>
-              <a:t>Compartmentalized, more stable</a:t>
-            </a:r>
-          </a:p>
-          <a:p>
-            <a:r>
-              <a:rPr lang="en-US" dirty="0">
-                <a:solidFill>
-                  <a:schemeClr val="accent6">
-                    <a:lumMod val="75000"/>
-                  </a:schemeClr>
-                </a:solidFill>
-              </a:rPr>
-              <a:t>(do not mess with your stuff)</a:t>
-            </a:r>
-          </a:p>
-        </p:txBody>
-      </p:sp>
-      <p:sp>
-        <p:nvSpPr>
-          <p:cNvPr id="81" name="Rombo 80">
-            <a:extLst>
-              <a:ext uri="{FF2B5EF4-FFF2-40B4-BE49-F238E27FC236}">
-                <a16:creationId xmlns:a16="http://schemas.microsoft.com/office/drawing/2014/main" id="{E2BDDA09-2ED4-F927-8010-472674B25E04}"/>
-              </a:ext>
-            </a:extLst>
-          </p:cNvPr>
-          <p:cNvSpPr/>
-          <p:nvPr/>
-        </p:nvSpPr>
-        <p:spPr>
-          <a:xfrm>
-            <a:off x="4967955" y="1273457"/>
+            <a:off x="7084353" y="1832757"/>
             <a:ext cx="3098801" cy="997389"/>
           </a:xfrm>
           <a:prstGeom prst="diamond">
@@ -4158,7 +3895,7 @@
                   </a:outerShdw>
                 </a:effectLst>
               </a:rPr>
-              <a:t>Can you install Docker? (Section 2.2.1)</a:t>
+              <a:t>Can you install Docker? (Section 2.1)</a:t>
             </a:r>
           </a:p>
         </p:txBody>
@@ -4177,7 +3914,7 @@
         </p:nvSpPr>
         <p:spPr>
           <a:xfrm>
-            <a:off x="3871058" y="2991274"/>
+            <a:off x="5335834" y="3364505"/>
             <a:ext cx="1584000" cy="720000"/>
           </a:xfrm>
           <a:prstGeom prst="rect">
@@ -4210,7 +3947,7 @@
             <a:pPr algn="ctr"/>
             <a:r>
               <a:rPr lang="en-US" dirty="0"/>
-              <a:t>Dual Boot (Section 2.3)</a:t>
+              <a:t>Dual Boot (Section 2.4)</a:t>
             </a:r>
           </a:p>
         </p:txBody>
@@ -4233,124 +3970,8 @@
         </p:nvCxnSpPr>
         <p:spPr>
           <a:xfrm rot="10800000" flipV="1">
-            <a:off x="3566160" y="3351273"/>
-            <a:ext cx="304898" cy="2672597"/>
-          </a:xfrm>
-          <a:prstGeom prst="bentConnector2">
-            <a:avLst/>
-          </a:prstGeom>
-          <a:ln w="57150">
-            <a:solidFill>
-              <a:schemeClr val="tx1"/>
-            </a:solidFill>
-            <a:tailEnd type="triangle"/>
-          </a:ln>
-        </p:spPr>
-        <p:style>
-          <a:lnRef idx="1">
-            <a:schemeClr val="accent1"/>
-          </a:lnRef>
-          <a:fillRef idx="0">
-            <a:schemeClr val="accent1"/>
-          </a:fillRef>
-          <a:effectRef idx="0">
-            <a:schemeClr val="accent1"/>
-          </a:effectRef>
-          <a:fontRef idx="minor">
-            <a:schemeClr val="tx1"/>
-          </a:fontRef>
-        </p:style>
-      </p:cxnSp>
-      <p:sp>
-        <p:nvSpPr>
-          <p:cNvPr id="91" name="Rombo 90">
-            <a:extLst>
-              <a:ext uri="{FF2B5EF4-FFF2-40B4-BE49-F238E27FC236}">
-                <a16:creationId xmlns:a16="http://schemas.microsoft.com/office/drawing/2014/main" id="{5EC2A83D-E3C6-B538-9E99-744D67DFD8B2}"/>
-              </a:ext>
-            </a:extLst>
-          </p:cNvPr>
-          <p:cNvSpPr/>
-          <p:nvPr/>
-        </p:nvSpPr>
-        <p:spPr>
-          <a:xfrm>
-            <a:off x="8578907" y="1338263"/>
-            <a:ext cx="1795460" cy="881062"/>
-          </a:xfrm>
-          <a:prstGeom prst="diamond">
-            <a:avLst/>
-          </a:prstGeom>
-          <a:solidFill>
-            <a:schemeClr val="accent4">
-              <a:lumMod val="60000"/>
-              <a:lumOff val="40000"/>
-            </a:schemeClr>
-          </a:solidFill>
-          <a:ln>
-            <a:noFill/>
-          </a:ln>
-        </p:spPr>
-        <p:style>
-          <a:lnRef idx="2">
-            <a:schemeClr val="accent1">
-              <a:shade val="50000"/>
-            </a:schemeClr>
-          </a:lnRef>
-          <a:fillRef idx="1">
-            <a:schemeClr val="accent1"/>
-          </a:fillRef>
-          <a:effectRef idx="0">
-            <a:schemeClr val="accent1"/>
-          </a:effectRef>
-          <a:fontRef idx="minor">
-            <a:schemeClr val="lt1"/>
-          </a:fontRef>
-        </p:style>
-        <p:txBody>
-          <a:bodyPr rtlCol="0" anchor="ctr"/>
-          <a:lstStyle/>
-          <a:p>
-            <a:pPr algn="ctr"/>
-            <a:r>
-              <a:rPr lang="en-US" dirty="0">
-                <a:ln w="0"/>
-                <a:solidFill>
-                  <a:schemeClr val="tx1"/>
-                </a:solidFill>
-                <a:effectLst>
-                  <a:outerShdw blurRad="38100" dist="19050" dir="2700000" algn="tl" rotWithShape="0">
-                    <a:schemeClr val="dk1">
-                      <a:alpha val="40000"/>
-                    </a:schemeClr>
-                  </a:outerShdw>
-                </a:effectLst>
-              </a:rPr>
-              <a:t>You can choose</a:t>
-            </a:r>
-          </a:p>
-        </p:txBody>
-      </p:sp>
-      <p:cxnSp>
-        <p:nvCxnSpPr>
-          <p:cNvPr id="157" name="Connettore a gomito 156">
-            <a:extLst>
-              <a:ext uri="{FF2B5EF4-FFF2-40B4-BE49-F238E27FC236}">
-                <a16:creationId xmlns:a16="http://schemas.microsoft.com/office/drawing/2014/main" id="{5B52019D-5625-34F6-8771-CC640120FE85}"/>
-              </a:ext>
-            </a:extLst>
-          </p:cNvPr>
-          <p:cNvCxnSpPr>
-            <a:cxnSpLocks/>
-            <a:stCxn id="81" idx="2"/>
-            <a:endCxn id="83" idx="3"/>
-          </p:cNvCxnSpPr>
-          <p:nvPr/>
-        </p:nvCxnSpPr>
-        <p:spPr>
-          <a:xfrm rot="5400000">
-            <a:off x="5445993" y="2279911"/>
-            <a:ext cx="1080428" cy="1062298"/>
+            <a:off x="3982696" y="3724505"/>
+            <a:ext cx="1353138" cy="1367644"/>
           </a:xfrm>
           <a:prstGeom prst="bentConnector2">
             <a:avLst/>
@@ -4379,70 +4000,24 @@
       </p:cxnSp>
       <p:cxnSp>
         <p:nvCxnSpPr>
-          <p:cNvPr id="159" name="Connettore 2 158">
-            <a:extLst>
-              <a:ext uri="{FF2B5EF4-FFF2-40B4-BE49-F238E27FC236}">
-                <a16:creationId xmlns:a16="http://schemas.microsoft.com/office/drawing/2014/main" id="{C423E958-F364-958A-0BE2-CC1EFD05E689}"/>
+          <p:cNvPr id="157" name="Connettore a gomito 156">
+            <a:extLst>
+              <a:ext uri="{FF2B5EF4-FFF2-40B4-BE49-F238E27FC236}">
+                <a16:creationId xmlns:a16="http://schemas.microsoft.com/office/drawing/2014/main" id="{5B52019D-5625-34F6-8771-CC640120FE85}"/>
               </a:ext>
             </a:extLst>
           </p:cNvPr>
           <p:cNvCxnSpPr>
             <a:cxnSpLocks/>
-            <a:stCxn id="81" idx="3"/>
-            <a:endCxn id="91" idx="1"/>
-          </p:cNvCxnSpPr>
-          <p:nvPr/>
-        </p:nvCxnSpPr>
-        <p:spPr>
-          <a:xfrm>
-            <a:off x="8066756" y="1772152"/>
-            <a:ext cx="512151" cy="6642"/>
-          </a:xfrm>
-          <a:prstGeom prst="straightConnector1">
-            <a:avLst/>
-          </a:prstGeom>
-          <a:ln w="57150">
-            <a:solidFill>
-              <a:schemeClr val="tx1"/>
-            </a:solidFill>
-            <a:tailEnd type="triangle"/>
-          </a:ln>
-        </p:spPr>
-        <p:style>
-          <a:lnRef idx="1">
-            <a:schemeClr val="accent1"/>
-          </a:lnRef>
-          <a:fillRef idx="0">
-            <a:schemeClr val="accent1"/>
-          </a:fillRef>
-          <a:effectRef idx="0">
-            <a:schemeClr val="accent1"/>
-          </a:effectRef>
-          <a:fontRef idx="minor">
-            <a:schemeClr val="tx1"/>
-          </a:fontRef>
-        </p:style>
-      </p:cxnSp>
-      <p:cxnSp>
-        <p:nvCxnSpPr>
-          <p:cNvPr id="161" name="Connettore a gomito 160">
-            <a:extLst>
-              <a:ext uri="{FF2B5EF4-FFF2-40B4-BE49-F238E27FC236}">
-                <a16:creationId xmlns:a16="http://schemas.microsoft.com/office/drawing/2014/main" id="{EB9B3B6A-1B13-DEDF-70AE-DB2DFF65F0B9}"/>
-              </a:ext>
-            </a:extLst>
-          </p:cNvPr>
-          <p:cNvCxnSpPr>
-            <a:cxnSpLocks/>
-            <a:stCxn id="91" idx="2"/>
+            <a:stCxn id="81" idx="2"/>
             <a:endCxn id="83" idx="3"/>
           </p:cNvCxnSpPr>
           <p:nvPr/>
         </p:nvCxnSpPr>
         <p:spPr>
           <a:xfrm rot="5400000">
-            <a:off x="6899874" y="774510"/>
-            <a:ext cx="1131949" cy="4021579"/>
+            <a:off x="7329615" y="2420365"/>
+            <a:ext cx="894359" cy="1713920"/>
           </a:xfrm>
           <a:prstGeom prst="bentConnector2">
             <a:avLst/>
@@ -4480,15 +4055,15 @@
           </p:cNvPr>
           <p:cNvCxnSpPr>
             <a:cxnSpLocks/>
-            <a:stCxn id="91" idx="3"/>
-            <a:endCxn id="17" idx="2"/>
+            <a:stCxn id="81" idx="3"/>
+            <a:endCxn id="17" idx="0"/>
           </p:cNvCxnSpPr>
           <p:nvPr/>
         </p:nvCxnSpPr>
         <p:spPr>
-          <a:xfrm flipV="1">
-            <a:off x="10374367" y="1080000"/>
-            <a:ext cx="917633" cy="698794"/>
+          <a:xfrm>
+            <a:off x="10183154" y="2331452"/>
+            <a:ext cx="715938" cy="2490697"/>
           </a:xfrm>
           <a:prstGeom prst="bentConnector2">
             <a:avLst/>
@@ -4520,57 +4095,6 @@
       </p:cxnSp>
       <p:cxnSp>
         <p:nvCxnSpPr>
-          <p:cNvPr id="166" name="Connettore a gomito 165">
-            <a:extLst>
-              <a:ext uri="{FF2B5EF4-FFF2-40B4-BE49-F238E27FC236}">
-                <a16:creationId xmlns:a16="http://schemas.microsoft.com/office/drawing/2014/main" id="{98F9F9B7-8F0D-94A4-3B00-F0E5FD1BAC32}"/>
-              </a:ext>
-            </a:extLst>
-          </p:cNvPr>
-          <p:cNvCxnSpPr>
-            <a:cxnSpLocks/>
-            <a:stCxn id="23" idx="0"/>
-            <a:endCxn id="17" idx="2"/>
-          </p:cNvCxnSpPr>
-          <p:nvPr/>
-        </p:nvCxnSpPr>
-        <p:spPr>
-          <a:xfrm rot="5400000" flipH="1" flipV="1">
-            <a:off x="6575004" y="1113496"/>
-            <a:ext cx="4750492" cy="4683500"/>
-          </a:xfrm>
-          <a:prstGeom prst="bentConnector3">
-            <a:avLst>
-              <a:gd name="adj1" fmla="val 29398"/>
-            </a:avLst>
-          </a:prstGeom>
-          <a:ln w="57150">
-            <a:solidFill>
-              <a:schemeClr val="accent6">
-                <a:lumMod val="60000"/>
-                <a:lumOff val="40000"/>
-              </a:schemeClr>
-            </a:solidFill>
-            <a:tailEnd type="triangle"/>
-          </a:ln>
-        </p:spPr>
-        <p:style>
-          <a:lnRef idx="1">
-            <a:schemeClr val="accent1"/>
-          </a:lnRef>
-          <a:fillRef idx="0">
-            <a:schemeClr val="accent1"/>
-          </a:fillRef>
-          <a:effectRef idx="0">
-            <a:schemeClr val="accent1"/>
-          </a:effectRef>
-          <a:fontRef idx="minor">
-            <a:schemeClr val="tx1"/>
-          </a:fontRef>
-        </p:style>
-      </p:cxnSp>
-      <p:cxnSp>
-        <p:nvCxnSpPr>
           <p:cNvPr id="192" name="Connettore 2 191">
             <a:extLst>
               <a:ext uri="{FF2B5EF4-FFF2-40B4-BE49-F238E27FC236}">
@@ -4587,8 +4111,8 @@
         </p:nvCxnSpPr>
         <p:spPr>
           <a:xfrm>
-            <a:off x="4391236" y="1771014"/>
-            <a:ext cx="576719" cy="1138"/>
+            <a:off x="4774696" y="2331452"/>
+            <a:ext cx="2309657" cy="0"/>
           </a:xfrm>
           <a:prstGeom prst="straightConnector1">
             <a:avLst/>
@@ -4617,30 +4141,31 @@
       </p:cxnSp>
       <p:cxnSp>
         <p:nvCxnSpPr>
-          <p:cNvPr id="229" name="Connettore 2 228">
-            <a:extLst>
-              <a:ext uri="{FF2B5EF4-FFF2-40B4-BE49-F238E27FC236}">
-                <a16:creationId xmlns:a16="http://schemas.microsoft.com/office/drawing/2014/main" id="{9B1B4B23-4253-6BE2-0FDA-D2666CB72585}"/>
+          <p:cNvPr id="24" name="Connettore 2 23">
+            <a:extLst>
+              <a:ext uri="{FF2B5EF4-FFF2-40B4-BE49-F238E27FC236}">
+                <a16:creationId xmlns:a16="http://schemas.microsoft.com/office/drawing/2014/main" id="{27942EEA-34B2-4108-D077-380E39F565A6}"/>
               </a:ext>
             </a:extLst>
           </p:cNvPr>
           <p:cNvCxnSpPr>
-            <a:stCxn id="23" idx="3"/>
-            <a:endCxn id="15" idx="1"/>
+            <a:cxnSpLocks/>
+            <a:stCxn id="13" idx="3"/>
+            <a:endCxn id="17" idx="1"/>
           </p:cNvCxnSpPr>
           <p:nvPr/>
         </p:nvCxnSpPr>
         <p:spPr>
           <a:xfrm>
-            <a:off x="7506230" y="6271023"/>
-            <a:ext cx="2885770" cy="0"/>
+            <a:off x="4774696" y="5362149"/>
+            <a:ext cx="5224396" cy="0"/>
           </a:xfrm>
           <a:prstGeom prst="straightConnector1">
             <a:avLst/>
           </a:prstGeom>
           <a:ln w="57150">
             <a:solidFill>
-              <a:schemeClr val="accent2">
+              <a:schemeClr val="accent6">
                 <a:lumMod val="60000"/>
                 <a:lumOff val="40000"/>
               </a:schemeClr>
@@ -4665,10 +4190,10 @@
       </p:cxnSp>
       <p:sp>
         <p:nvSpPr>
-          <p:cNvPr id="232" name="CasellaDiTesto 231">
-            <a:extLst>
-              <a:ext uri="{FF2B5EF4-FFF2-40B4-BE49-F238E27FC236}">
-                <a16:creationId xmlns:a16="http://schemas.microsoft.com/office/drawing/2014/main" id="{EFF83FFD-C963-EE41-9A39-D0455091DFB7}"/>
+          <p:cNvPr id="253" name="CasellaDiTesto 252">
+            <a:extLst>
+              <a:ext uri="{FF2B5EF4-FFF2-40B4-BE49-F238E27FC236}">
+                <a16:creationId xmlns:a16="http://schemas.microsoft.com/office/drawing/2014/main" id="{37EB1CE3-4868-4562-19F0-1FB1B2192442}"/>
               </a:ext>
             </a:extLst>
           </p:cNvPr>
@@ -4677,8 +4202,8 @@
         </p:nvSpPr>
         <p:spPr>
           <a:xfrm>
-            <a:off x="6520769" y="2769541"/>
-            <a:ext cx="3098800" cy="1200329"/>
+            <a:off x="10279993" y="1925529"/>
+            <a:ext cx="522259" cy="369332"/>
           </a:xfrm>
           <a:prstGeom prst="rect">
             <a:avLst/>
@@ -4686,14 +4211,55 @@
           <a:noFill/>
         </p:spPr>
         <p:txBody>
-          <a:bodyPr wrap="square" rtlCol="0">
+          <a:bodyPr wrap="none" rtlCol="0">
             <a:spAutoFit/>
           </a:bodyPr>
           <a:lstStyle/>
           <a:p>
             <a:r>
-              <a:rPr lang="en-US" dirty="0"/>
-              <a:t>Install Linux in parallel on your machine (code will run much faster but installing a new OS requires a significant effort)</a:t>
+              <a:rPr lang="en-US" b="1" dirty="0">
+                <a:solidFill>
+                  <a:schemeClr val="accent6">
+                    <a:lumMod val="75000"/>
+                  </a:schemeClr>
+                </a:solidFill>
+              </a:rPr>
+              <a:t>YES</a:t>
+            </a:r>
+          </a:p>
+        </p:txBody>
+      </p:sp>
+      <p:sp>
+        <p:nvSpPr>
+          <p:cNvPr id="255" name="CasellaDiTesto 254">
+            <a:extLst>
+              <a:ext uri="{FF2B5EF4-FFF2-40B4-BE49-F238E27FC236}">
+                <a16:creationId xmlns:a16="http://schemas.microsoft.com/office/drawing/2014/main" id="{89AA7A54-453E-30FC-785E-5964F0D0A3A9}"/>
+              </a:ext>
+            </a:extLst>
+          </p:cNvPr>
+          <p:cNvSpPr txBox="1"/>
+          <p:nvPr/>
+        </p:nvSpPr>
+        <p:spPr>
+          <a:xfrm>
+            <a:off x="8012087" y="2959507"/>
+            <a:ext cx="492443" cy="369332"/>
+          </a:xfrm>
+          <a:prstGeom prst="rect">
+            <a:avLst/>
+          </a:prstGeom>
+          <a:noFill/>
+        </p:spPr>
+        <p:txBody>
+          <a:bodyPr wrap="none" rtlCol="0">
+            <a:spAutoFit/>
+          </a:bodyPr>
+          <a:lstStyle/>
+          <a:p>
+            <a:r>
+              <a:rPr lang="en-US" b="1" dirty="0"/>
+              <a:t>NO</a:t>
             </a:r>
           </a:p>
         </p:txBody>

</xml_diff>